<commit_message>
Minor formatting changes to slides
</commit_message>
<xml_diff>
--- a/slides/01_course_overview.pptx
+++ b/slides/01_course_overview.pptx
@@ -6,7 +6,7 @@
     <p:sldMasterId id="2147483649" r:id="rId2"/>
   </p:sldMasterIdLst>
   <p:notesMasterIdLst>
-    <p:notesMasterId r:id="rId13"/>
+    <p:notesMasterId r:id="rId12"/>
   </p:notesMasterIdLst>
   <p:sldIdLst>
     <p:sldId id="258" r:id="rId3"/>
@@ -15,10 +15,9 @@
     <p:sldId id="362" r:id="rId6"/>
     <p:sldId id="385" r:id="rId7"/>
     <p:sldId id="386" r:id="rId8"/>
-    <p:sldId id="387" r:id="rId9"/>
-    <p:sldId id="389" r:id="rId10"/>
-    <p:sldId id="388" r:id="rId11"/>
-    <p:sldId id="314" r:id="rId12"/>
+    <p:sldId id="389" r:id="rId9"/>
+    <p:sldId id="388" r:id="rId10"/>
+    <p:sldId id="314" r:id="rId11"/>
   </p:sldIdLst>
   <p:sldSz cx="9363075" cy="5257800"/>
   <p:notesSz cx="6858000" cy="9144000"/>
@@ -241,7 +240,7 @@
           <a:p>
             <a:fld id="{DB92F479-4B50-F243-9713-1B12EC2B4BDB}" type="datetimeFigureOut">
               <a:rPr lang="en-US" smtClean="0"/>
-              <a:t>2/19/2015</a:t>
+              <a:t>2/21/2015</a:t>
             </a:fld>
             <a:endParaRPr lang="en-US"/>
           </a:p>
@@ -593,90 +592,6 @@
 </p:notes>
 </file>
 
-<file path=ppt/notesSlides/notesSlide10.xml><?xml version="1.0" encoding="utf-8"?>
-<p:notes xmlns:a="http://schemas.openxmlformats.org/drawingml/2006/main" xmlns:r="http://schemas.openxmlformats.org/officeDocument/2006/relationships" xmlns:p="http://schemas.openxmlformats.org/presentationml/2006/main">
-  <p:cSld>
-    <p:spTree>
-      <p:nvGrpSpPr>
-        <p:cNvPr id="1" name=""/>
-        <p:cNvGrpSpPr/>
-        <p:nvPr/>
-      </p:nvGrpSpPr>
-      <p:grpSpPr>
-        <a:xfrm>
-          <a:off x="0" y="0"/>
-          <a:ext cx="0" cy="0"/>
-          <a:chOff x="0" y="0"/>
-          <a:chExt cx="0" cy="0"/>
-        </a:xfrm>
-      </p:grpSpPr>
-      <p:sp>
-        <p:nvSpPr>
-          <p:cNvPr id="2" name="Slide Image Placeholder 1"/>
-          <p:cNvSpPr>
-            <a:spLocks noGrp="1" noRot="1" noChangeAspect="1"/>
-          </p:cNvSpPr>
-          <p:nvPr>
-            <p:ph type="sldImg"/>
-          </p:nvPr>
-        </p:nvSpPr>
-        <p:spPr/>
-      </p:sp>
-      <p:sp>
-        <p:nvSpPr>
-          <p:cNvPr id="3" name="Notes Placeholder 2"/>
-          <p:cNvSpPr>
-            <a:spLocks noGrp="1"/>
-          </p:cNvSpPr>
-          <p:nvPr>
-            <p:ph type="body" idx="1"/>
-          </p:nvPr>
-        </p:nvSpPr>
-        <p:spPr/>
-        <p:txBody>
-          <a:bodyPr/>
-          <a:lstStyle/>
-          <a:p>
-            <a:endParaRPr lang="en-US" dirty="0"/>
-          </a:p>
-        </p:txBody>
-      </p:sp>
-      <p:sp>
-        <p:nvSpPr>
-          <p:cNvPr id="4" name="Slide Number Placeholder 3"/>
-          <p:cNvSpPr>
-            <a:spLocks noGrp="1"/>
-          </p:cNvSpPr>
-          <p:nvPr>
-            <p:ph type="sldNum" sz="quarter" idx="10"/>
-          </p:nvPr>
-        </p:nvSpPr>
-        <p:spPr/>
-        <p:txBody>
-          <a:bodyPr/>
-          <a:lstStyle/>
-          <a:p>
-            <a:fld id="{ADD4B5B7-85EF-4E48-AC80-2380FACD9C23}" type="slidenum">
-              <a:rPr lang="en-US" smtClean="0"/>
-              <a:t>10</a:t>
-            </a:fld>
-            <a:endParaRPr lang="en-US"/>
-          </a:p>
-        </p:txBody>
-      </p:sp>
-    </p:spTree>
-    <p:extLst>
-      <p:ext uri="{BB962C8B-B14F-4D97-AF65-F5344CB8AC3E}">
-        <p14:creationId xmlns:p14="http://schemas.microsoft.com/office/powerpoint/2010/main" val="158773868"/>
-      </p:ext>
-    </p:extLst>
-  </p:cSld>
-  <p:clrMapOvr>
-    <a:masterClrMapping/>
-  </p:clrMapOvr>
-</p:notes>
-</file>
-
 <file path=ppt/notesSlides/notesSlide2.xml><?xml version="1.0" encoding="utf-8"?>
 <p:notes xmlns:a="http://schemas.openxmlformats.org/drawingml/2006/main" xmlns:r="http://schemas.openxmlformats.org/officeDocument/2006/relationships" xmlns:p="http://schemas.openxmlformats.org/presentationml/2006/main">
   <p:cSld>
@@ -1488,7 +1403,7 @@
           <a:bodyPr/>
           <a:lstStyle/>
           <a:p>
-            <a:endParaRPr lang="en-US" baseline="0" dirty="0" smtClean="0"/>
+            <a:endParaRPr lang="en-US" dirty="0"/>
           </a:p>
         </p:txBody>
       </p:sp>
@@ -1518,7 +1433,7 @@
     </p:spTree>
     <p:extLst>
       <p:ext uri="{BB962C8B-B14F-4D97-AF65-F5344CB8AC3E}">
-        <p14:creationId xmlns:p14="http://schemas.microsoft.com/office/powerpoint/2010/main" val="645762702"/>
+        <p14:creationId xmlns:p14="http://schemas.microsoft.com/office/powerpoint/2010/main" val="158773868"/>
       </p:ext>
     </p:extLst>
   </p:cSld>
@@ -7990,118 +7905,6 @@
 </p:sld>
 </file>
 
-<file path=ppt/slides/slide10.xml><?xml version="1.0" encoding="utf-8"?>
-<p:sld xmlns:a="http://schemas.openxmlformats.org/drawingml/2006/main" xmlns:r="http://schemas.openxmlformats.org/officeDocument/2006/relationships" xmlns:p="http://schemas.openxmlformats.org/presentationml/2006/main">
-  <p:cSld>
-    <p:spTree>
-      <p:nvGrpSpPr>
-        <p:cNvPr id="1" name=""/>
-        <p:cNvGrpSpPr/>
-        <p:nvPr/>
-      </p:nvGrpSpPr>
-      <p:grpSpPr>
-        <a:xfrm>
-          <a:off x="0" y="0"/>
-          <a:ext cx="0" cy="0"/>
-          <a:chOff x="0" y="0"/>
-          <a:chExt cx="0" cy="0"/>
-        </a:xfrm>
-      </p:grpSpPr>
-      <p:sp>
-        <p:nvSpPr>
-          <p:cNvPr id="2" name="Title 1"/>
-          <p:cNvSpPr>
-            <a:spLocks noGrp="1"/>
-          </p:cNvSpPr>
-          <p:nvPr>
-            <p:ph type="title"/>
-          </p:nvPr>
-        </p:nvSpPr>
-        <p:spPr>
-          <a:xfrm>
-            <a:off x="338137" y="3238500"/>
-            <a:ext cx="8426450" cy="1055687"/>
-          </a:xfrm>
-        </p:spPr>
-        <p:txBody>
-          <a:bodyPr/>
-          <a:lstStyle/>
-          <a:p>
-            <a:pPr>
-              <a:defRPr/>
-            </a:pPr>
-            <a:r>
-              <a:rPr lang="en-US" dirty="0" smtClean="0"/>
-              <a:t>Questions?</a:t>
-            </a:r>
-            <a:endParaRPr lang="en-US" sz="2000" dirty="0">
-              <a:latin typeface="+mn-lt"/>
-            </a:endParaRPr>
-          </a:p>
-        </p:txBody>
-      </p:sp>
-      <p:sp>
-        <p:nvSpPr>
-          <p:cNvPr id="4" name="Content Placeholder 3"/>
-          <p:cNvSpPr>
-            <a:spLocks noGrp="1"/>
-          </p:cNvSpPr>
-          <p:nvPr>
-            <p:ph sz="quarter" idx="11"/>
-          </p:nvPr>
-        </p:nvSpPr>
-        <p:spPr>
-          <a:xfrm>
-            <a:off x="371475" y="495300"/>
-            <a:ext cx="6400800" cy="304800"/>
-          </a:xfrm>
-        </p:spPr>
-        <p:txBody>
-          <a:bodyPr wrap="square" lIns="91440" tIns="45720" rIns="91440" bIns="45720" numCol="1" anchor="t" anchorCtr="0" compatLnSpc="1">
-            <a:prstTxWarp prst="textNoShape">
-              <a:avLst/>
-            </a:prstTxWarp>
-          </a:bodyPr>
-          <a:lstStyle/>
-          <a:p>
-            <a:pPr marL="0" indent="0"/>
-            <a:r>
-              <a:rPr lang="en-US" cap="none" dirty="0" smtClean="0">
-                <a:latin typeface="PFDinTextCompPro-Bold" charset="0"/>
-                <a:ea typeface="ヒラギノ角ゴ ProN W3" charset="0"/>
-                <a:cs typeface="ヒラギノ角ゴ ProN W3" charset="0"/>
-              </a:rPr>
-              <a:t>COURSE OVERVIEW</a:t>
-            </a:r>
-            <a:endParaRPr lang="en-US" cap="none" dirty="0">
-              <a:latin typeface="PFDinTextCompPro-Bold" charset="0"/>
-              <a:ea typeface="ヒラギノ角ゴ ProN W3" charset="0"/>
-              <a:cs typeface="ヒラギノ角ゴ ProN W3" charset="0"/>
-            </a:endParaRPr>
-          </a:p>
-        </p:txBody>
-      </p:sp>
-    </p:spTree>
-    <p:extLst>
-      <p:ext uri="{BB962C8B-B14F-4D97-AF65-F5344CB8AC3E}">
-        <p14:creationId xmlns:p14="http://schemas.microsoft.com/office/powerpoint/2010/main" val="3636308423"/>
-      </p:ext>
-    </p:extLst>
-  </p:cSld>
-  <p:clrMapOvr>
-    <a:masterClrMapping/>
-  </p:clrMapOvr>
-  <p:transition/>
-  <p:timing>
-    <p:tnLst>
-      <p:par>
-        <p:cTn id="1" dur="indefinite" restart="never" nodeType="tmRoot"/>
-      </p:par>
-    </p:tnLst>
-  </p:timing>
-</p:sld>
-</file>
-
 <file path=ppt/slides/slide2.xml><?xml version="1.0" encoding="utf-8"?>
 <p:sld xmlns:a="http://schemas.openxmlformats.org/drawingml/2006/main" xmlns:r="http://schemas.openxmlformats.org/officeDocument/2006/relationships" xmlns:p="http://schemas.openxmlformats.org/presentationml/2006/main">
   <p:cSld>
@@ -8153,7 +7956,7 @@
               </a14:hiddenLine>
             </a:ext>
             <a:ext uri="{FAA26D3D-D897-4be2-8F04-BA451C77F1D7}">
-              <ma14:placeholderFlag xmlns:ma14="http://schemas.microsoft.com/office/mac/drawingml/2011/main" xmlns="" val="1"/>
+              <ma14:placeholderFlag xmlns="" xmlns:ma14="http://schemas.microsoft.com/office/mac/drawingml/2011/main" val="1"/>
             </a:ext>
           </a:extLst>
         </p:spPr>
@@ -8183,15 +7986,7 @@
                 <a:ea typeface="ヒラギノ角ゴ ProN W6" charset="0"/>
                 <a:cs typeface="ヒラギノ角ゴ ProN W6" charset="0"/>
               </a:rPr>
-              <a:t>0. 	Meet </a:t>
-            </a:r>
-            <a:r>
-              <a:rPr lang="en-US" sz="3000" dirty="0" smtClean="0">
-                <a:latin typeface="PFDinTextCompPro-Bold" charset="0"/>
-                <a:ea typeface="ヒラギノ角ゴ ProN W6" charset="0"/>
-                <a:cs typeface="ヒラギノ角ゴ ProN W6" charset="0"/>
-              </a:rPr>
-              <a:t>Your Instructors</a:t>
+              <a:t>0. 	Meet Your Instructors</a:t>
             </a:r>
             <a:br>
               <a:rPr lang="en-US" sz="3000" dirty="0" smtClean="0">
@@ -8206,15 +8001,7 @@
                 <a:ea typeface="ヒラギノ角ゴ ProN W6" charset="0"/>
                 <a:cs typeface="ヒラギノ角ゴ ProN W6" charset="0"/>
               </a:rPr>
-              <a:t>I.	Instructor </a:t>
-            </a:r>
-            <a:r>
-              <a:rPr lang="en-US" sz="3000" dirty="0" smtClean="0">
-                <a:latin typeface="PFDinTextCompPro-Bold" charset="0"/>
-                <a:ea typeface="ヒラギノ角ゴ ProN W6" charset="0"/>
-                <a:cs typeface="ヒラギノ角ゴ ProN W6" charset="0"/>
-              </a:rPr>
-              <a:t>Philosophy</a:t>
+              <a:t>I.	Instructor Philosophy</a:t>
             </a:r>
             <a:br>
               <a:rPr lang="en-US" sz="3000" dirty="0" smtClean="0">
@@ -8229,31 +8016,7 @@
                 <a:ea typeface="ヒラギノ角ゴ ProN W6" charset="0"/>
                 <a:cs typeface="ヒラギノ角ゴ ProN W6" charset="0"/>
               </a:rPr>
-              <a:t>II</a:t>
-            </a:r>
-            <a:r>
-              <a:rPr lang="en-US" sz="3000" dirty="0" smtClean="0">
-                <a:latin typeface="PFDinTextCompPro-Bold" charset="0"/>
-                <a:ea typeface="ヒラギノ角ゴ ProN W6" charset="0"/>
-                <a:cs typeface="ヒラギノ角ゴ ProN W6" charset="0"/>
-              </a:rPr>
-              <a:t>. </a:t>
-            </a:r>
-            <a:r>
-              <a:rPr lang="en-US" sz="3000" dirty="0" smtClean="0">
-                <a:latin typeface="PFDinTextCompPro-Bold" charset="0"/>
-                <a:ea typeface="ヒラギノ角ゴ ProN W6" charset="0"/>
-                <a:cs typeface="ヒラギノ角ゴ ProN W6" charset="0"/>
-              </a:rPr>
-              <a:t>	Content </a:t>
-            </a:r>
-            <a:r>
-              <a:rPr lang="en-US" sz="3000" dirty="0" smtClean="0">
-                <a:latin typeface="PFDinTextCompPro-Bold" charset="0"/>
-                <a:ea typeface="ヒラギノ角ゴ ProN W6" charset="0"/>
-                <a:cs typeface="ヒラギノ角ゴ ProN W6" charset="0"/>
-              </a:rPr>
-              <a:t>Philosophy</a:t>
+              <a:t>II. 	Content Philosophy</a:t>
             </a:r>
             <a:br>
               <a:rPr lang="en-US" sz="3000" dirty="0" smtClean="0">
@@ -8268,15 +8031,7 @@
                 <a:ea typeface="ヒラギノ角ゴ ProN W6" charset="0"/>
                 <a:cs typeface="ヒラギノ角ゴ ProN W6" charset="0"/>
               </a:rPr>
-              <a:t>III. 	How </a:t>
-            </a:r>
-            <a:r>
-              <a:rPr lang="en-US" sz="3000" dirty="0" smtClean="0">
-                <a:latin typeface="PFDinTextCompPro-Bold" charset="0"/>
-                <a:ea typeface="ヒラギノ角ゴ ProN W6" charset="0"/>
-                <a:cs typeface="ヒラギノ角ゴ ProN W6" charset="0"/>
-              </a:rPr>
-              <a:t>to Succeed</a:t>
+              <a:t>III. 	How to Succeed</a:t>
             </a:r>
             <a:br>
               <a:rPr lang="en-US" sz="3000" dirty="0" smtClean="0">
@@ -8291,31 +8046,7 @@
                 <a:ea typeface="ヒラギノ角ゴ ProN W6" charset="0"/>
                 <a:cs typeface="ヒラギノ角ゴ ProN W6" charset="0"/>
               </a:rPr>
-              <a:t>IV</a:t>
-            </a:r>
-            <a:r>
-              <a:rPr lang="en-US" sz="3000" dirty="0" smtClean="0">
-                <a:latin typeface="PFDinTextCompPro-Bold" charset="0"/>
-                <a:ea typeface="ヒラギノ角ゴ ProN W6" charset="0"/>
-                <a:cs typeface="ヒラギノ角ゴ ProN W6" charset="0"/>
-              </a:rPr>
-              <a:t>. </a:t>
-            </a:r>
-            <a:r>
-              <a:rPr lang="en-US" sz="3000" dirty="0" smtClean="0">
-                <a:latin typeface="PFDinTextCompPro-Bold" charset="0"/>
-                <a:ea typeface="ヒラギノ角ゴ ProN W6" charset="0"/>
-                <a:cs typeface="ヒラギノ角ゴ ProN W6" charset="0"/>
-              </a:rPr>
-              <a:t>	Typical </a:t>
-            </a:r>
-            <a:r>
-              <a:rPr lang="en-US" sz="3000" dirty="0" smtClean="0">
-                <a:latin typeface="PFDinTextCompPro-Bold" charset="0"/>
-                <a:ea typeface="ヒラギノ角ゴ ProN W6" charset="0"/>
-                <a:cs typeface="ヒラギノ角ゴ ProN W6" charset="0"/>
-              </a:rPr>
-              <a:t>Class</a:t>
+              <a:t>IV. 	Typical Class</a:t>
             </a:r>
             <a:br>
               <a:rPr lang="en-US" sz="3000" dirty="0" smtClean="0">
@@ -8332,14 +8063,6 @@
               </a:rPr>
               <a:t>V. 	Logistics</a:t>
             </a:r>
-            <a:r>
-              <a:rPr lang="en-US" sz="3000" dirty="0" smtClean="0">
-                <a:latin typeface="PFDinTextCompPro-Bold" charset="0"/>
-                <a:ea typeface="ヒラギノ角ゴ ProN W6" charset="0"/>
-                <a:cs typeface="ヒラギノ角ゴ ProN W6" charset="0"/>
-              </a:rPr>
-              <a:t/>
-            </a:r>
             <a:br>
               <a:rPr lang="en-US" sz="3000" dirty="0" smtClean="0">
                 <a:latin typeface="PFDinTextCompPro-Bold" charset="0"/>
@@ -8353,31 +8076,7 @@
                 <a:ea typeface="ヒラギノ角ゴ ProN W6" charset="0"/>
                 <a:cs typeface="ヒラギノ角ゴ ProN W6" charset="0"/>
               </a:rPr>
-              <a:t>VI</a:t>
-            </a:r>
-            <a:r>
-              <a:rPr lang="en-US" sz="3000" dirty="0" smtClean="0">
-                <a:latin typeface="PFDinTextCompPro-Bold" charset="0"/>
-                <a:ea typeface="ヒラギノ角ゴ ProN W6" charset="0"/>
-                <a:cs typeface="ヒラギノ角ゴ ProN W6" charset="0"/>
-              </a:rPr>
-              <a:t>. </a:t>
-            </a:r>
-            <a:r>
-              <a:rPr lang="en-US" sz="3000" dirty="0" smtClean="0">
-                <a:latin typeface="PFDinTextCompPro-Bold" charset="0"/>
-                <a:ea typeface="ヒラギノ角ゴ ProN W6" charset="0"/>
-                <a:cs typeface="ヒラギノ角ゴ ProN W6" charset="0"/>
-              </a:rPr>
-              <a:t>	Questions</a:t>
-            </a:r>
-            <a:r>
-              <a:rPr lang="en-US" sz="3000" dirty="0" smtClean="0">
-                <a:latin typeface="PFDinTextCompPro-Bold" charset="0"/>
-                <a:ea typeface="ヒラギノ角ゴ ProN W6" charset="0"/>
-                <a:cs typeface="ヒラギノ角ゴ ProN W6" charset="0"/>
-              </a:rPr>
-              <a:t>?</a:t>
+              <a:t>VI. 	Questions?</a:t>
             </a:r>
             <a:endParaRPr lang="en-US" sz="3000" cap="none" dirty="0">
               <a:latin typeface="PFDinTextCompPro-Bold" charset="0"/>
@@ -8535,7 +8234,7 @@
               </a14:hiddenLine>
             </a:ext>
             <a:ext uri="{FAA26D3D-D897-4be2-8F04-BA451C77F1D7}">
-              <ma14:placeholderFlag xmlns:ma14="http://schemas.microsoft.com/office/mac/drawingml/2011/main" xmlns="" val="1"/>
+              <ma14:placeholderFlag xmlns="" xmlns:ma14="http://schemas.microsoft.com/office/mac/drawingml/2011/main" val="1"/>
             </a:ext>
           </a:extLst>
         </p:spPr>
@@ -8620,14 +8319,6 @@
                 <a:cs typeface="ヒラギノ角ゴ ProN W6" charset="0"/>
               </a:rPr>
               <a:t>JOSIAH DAVIS</a:t>
-            </a:r>
-            <a:r>
-              <a:rPr lang="en-US" sz="6000" b="0" cap="none" dirty="0" smtClean="0">
-                <a:latin typeface="PFDinTextCompPro-Bold" panose="02000806000000020004" pitchFamily="2" charset="0"/>
-                <a:ea typeface="ヒラギノ角ゴ ProN W6" charset="0"/>
-                <a:cs typeface="ヒラギノ角ゴ ProN W6" charset="0"/>
-              </a:rPr>
-              <a:t/>
             </a:r>
             <a:br>
               <a:rPr lang="en-US" sz="6000" b="0" cap="none" dirty="0" smtClean="0">
@@ -10189,7 +9880,7 @@
     </p:spTree>
     <p:extLst>
       <p:ext uri="{BB962C8B-B14F-4D97-AF65-F5344CB8AC3E}">
-        <p14:creationId xmlns:p14="http://schemas.microsoft.com/office/powerpoint/2010/main" val="3947763434"/>
+        <p14:creationId xmlns:p14="http://schemas.microsoft.com/office/powerpoint/2010/main" val="3174620016"/>
       </p:ext>
     </p:extLst>
   </p:cSld>
@@ -10471,7 +10162,7 @@
             </a:pPr>
             <a:r>
               <a:rPr lang="en-US" dirty="0" smtClean="0"/>
-              <a:t>Typical Class</a:t>
+              <a:t>Logistics</a:t>
             </a:r>
           </a:p>
         </p:txBody>
@@ -10514,7 +10205,7 @@
         <p:spPr>
           <a:xfrm>
             <a:off x="1100137" y="1257300"/>
-            <a:ext cx="6858000" cy="2246769"/>
+            <a:ext cx="6858000" cy="4093428"/>
           </a:xfrm>
           <a:prstGeom prst="rect">
             <a:avLst/>
@@ -10527,432 +10218,147 @@
           <a:lstStyle/>
           <a:p>
             <a:pPr marL="285750" indent="-285750" algn="l">
+              <a:lnSpc>
+                <a:spcPct val="150000"/>
+              </a:lnSpc>
               <a:buFont typeface="Arial"/>
               <a:buChar char="•"/>
             </a:pPr>
             <a:r>
               <a:rPr lang="en-US" sz="2000" dirty="0" smtClean="0"/>
-              <a:t>Lecture</a:t>
-            </a:r>
+              <a:t>Bathrooms</a:t>
+            </a:r>
+            <a:endParaRPr lang="en-US" sz="2000" dirty="0"/>
           </a:p>
           <a:p>
             <a:pPr marL="285750" indent="-285750" algn="l">
+              <a:lnSpc>
+                <a:spcPct val="150000"/>
+              </a:lnSpc>
               <a:buFont typeface="Arial"/>
               <a:buChar char="•"/>
             </a:pPr>
-            <a:endParaRPr lang="en-US" sz="2000" dirty="0"/>
+            <a:r>
+              <a:rPr lang="en-US" sz="2000" dirty="0" smtClean="0"/>
+              <a:t>Parking</a:t>
+            </a:r>
+            <a:endParaRPr lang="en-US" sz="2000" dirty="0" smtClean="0"/>
           </a:p>
           <a:p>
             <a:pPr marL="285750" indent="-285750" algn="l">
+              <a:lnSpc>
+                <a:spcPct val="150000"/>
+              </a:lnSpc>
               <a:buFont typeface="Arial"/>
               <a:buChar char="•"/>
             </a:pPr>
             <a:r>
               <a:rPr lang="en-US" sz="2000" dirty="0" smtClean="0"/>
-              <a:t>Code walk-throughs</a:t>
-            </a:r>
+              <a:t>Dress </a:t>
+            </a:r>
+            <a:r>
+              <a:rPr lang="en-US" sz="2000" dirty="0" smtClean="0"/>
+              <a:t>code</a:t>
+            </a:r>
+            <a:endParaRPr lang="en-US" sz="2000" dirty="0" smtClean="0"/>
           </a:p>
           <a:p>
             <a:pPr marL="285750" indent="-285750" algn="l">
+              <a:lnSpc>
+                <a:spcPct val="150000"/>
+              </a:lnSpc>
               <a:buFont typeface="Arial"/>
               <a:buChar char="•"/>
             </a:pPr>
+            <a:r>
+              <a:rPr lang="en-US" sz="2000" dirty="0" smtClean="0"/>
+              <a:t>Start </a:t>
+            </a:r>
+            <a:r>
+              <a:rPr lang="en-US" sz="2000" dirty="0"/>
+              <a:t>and end on </a:t>
+            </a:r>
+            <a:r>
+              <a:rPr lang="en-US" sz="2000" dirty="0" smtClean="0"/>
+              <a:t>time</a:t>
+            </a:r>
             <a:endParaRPr lang="en-US" sz="2000" dirty="0"/>
           </a:p>
           <a:p>
             <a:pPr marL="285750" indent="-285750" algn="l">
+              <a:lnSpc>
+                <a:spcPct val="150000"/>
+              </a:lnSpc>
               <a:buFont typeface="Arial"/>
               <a:buChar char="•"/>
             </a:pPr>
             <a:r>
+              <a:rPr lang="en-US" sz="2000" dirty="0"/>
+              <a:t>Missing </a:t>
+            </a:r>
+            <a:r>
               <a:rPr lang="en-US" sz="2000" dirty="0" smtClean="0"/>
-              <a:t>Code exercises</a:t>
-            </a:r>
+              <a:t>class</a:t>
+            </a:r>
+            <a:endParaRPr lang="en-US" sz="2000" dirty="0"/>
           </a:p>
           <a:p>
             <a:pPr marL="285750" indent="-285750" algn="l">
+              <a:lnSpc>
+                <a:spcPct val="150000"/>
+              </a:lnSpc>
               <a:buFont typeface="Arial"/>
               <a:buChar char="•"/>
             </a:pPr>
+            <a:r>
+              <a:rPr lang="en-US" sz="2000" dirty="0"/>
+              <a:t>Slack instead of </a:t>
+            </a:r>
+            <a:r>
+              <a:rPr lang="en-US" sz="2000" dirty="0" smtClean="0"/>
+              <a:t>email</a:t>
+            </a:r>
             <a:endParaRPr lang="en-US" sz="2000" dirty="0"/>
           </a:p>
           <a:p>
             <a:pPr marL="285750" indent="-285750" algn="l">
+              <a:lnSpc>
+                <a:spcPct val="150000"/>
+              </a:lnSpc>
               <a:buFont typeface="Arial"/>
               <a:buChar char="•"/>
             </a:pPr>
             <a:r>
+              <a:rPr lang="en-US" sz="2000" dirty="0"/>
+              <a:t>Office </a:t>
+            </a:r>
+            <a:r>
               <a:rPr lang="en-US" sz="2000" dirty="0" smtClean="0"/>
-              <a:t>Discussion of homework and readings</a:t>
-            </a:r>
-          </a:p>
-        </p:txBody>
-      </p:sp>
-    </p:spTree>
-    <p:extLst>
-      <p:ext uri="{BB962C8B-B14F-4D97-AF65-F5344CB8AC3E}">
-        <p14:creationId xmlns:p14="http://schemas.microsoft.com/office/powerpoint/2010/main" val="3174620016"/>
-      </p:ext>
-    </p:extLst>
-  </p:cSld>
-  <p:clrMapOvr>
-    <a:masterClrMapping/>
-  </p:clrMapOvr>
-  <p:transition/>
-  <p:timing>
-    <p:tnLst>
-      <p:par>
-        <p:cTn id="1" dur="indefinite" restart="never" nodeType="tmRoot">
-          <p:childTnLst>
-            <p:seq concurrent="1" nextAc="seek">
-              <p:cTn id="2" dur="indefinite" nodeType="mainSeq">
-                <p:childTnLst>
-                  <p:par>
-                    <p:cTn id="3" fill="hold">
-                      <p:stCondLst>
-                        <p:cond delay="indefinite"/>
-                      </p:stCondLst>
-                      <p:childTnLst>
-                        <p:par>
-                          <p:cTn id="4" fill="hold">
-                            <p:stCondLst>
-                              <p:cond delay="0"/>
-                            </p:stCondLst>
-                            <p:childTnLst>
-                              <p:par>
-                                <p:cTn id="5" presetID="1" presetClass="entr" presetSubtype="0" fill="hold" nodeType="clickEffect">
-                                  <p:stCondLst>
-                                    <p:cond delay="0"/>
-                                  </p:stCondLst>
-                                  <p:childTnLst>
-                                    <p:set>
-                                      <p:cBhvr>
-                                        <p:cTn id="6" dur="1" fill="hold">
-                                          <p:stCondLst>
-                                            <p:cond delay="0"/>
-                                          </p:stCondLst>
-                                        </p:cTn>
-                                        <p:tgtEl>
-                                          <p:spTgt spid="5">
-                                            <p:txEl>
-                                              <p:pRg st="0" end="0"/>
-                                            </p:txEl>
-                                          </p:spTgt>
-                                        </p:tgtEl>
-                                        <p:attrNameLst>
-                                          <p:attrName>style.visibility</p:attrName>
-                                        </p:attrNameLst>
-                                      </p:cBhvr>
-                                      <p:to>
-                                        <p:strVal val="visible"/>
-                                      </p:to>
-                                    </p:set>
-                                  </p:childTnLst>
-                                </p:cTn>
-                              </p:par>
-                            </p:childTnLst>
-                          </p:cTn>
-                        </p:par>
-                      </p:childTnLst>
-                    </p:cTn>
-                  </p:par>
-                  <p:par>
-                    <p:cTn id="7" fill="hold">
-                      <p:stCondLst>
-                        <p:cond delay="indefinite"/>
-                      </p:stCondLst>
-                      <p:childTnLst>
-                        <p:par>
-                          <p:cTn id="8" fill="hold">
-                            <p:stCondLst>
-                              <p:cond delay="0"/>
-                            </p:stCondLst>
-                            <p:childTnLst>
-                              <p:par>
-                                <p:cTn id="9" presetID="1" presetClass="entr" presetSubtype="0" fill="hold" nodeType="clickEffect">
-                                  <p:stCondLst>
-                                    <p:cond delay="0"/>
-                                  </p:stCondLst>
-                                  <p:childTnLst>
-                                    <p:set>
-                                      <p:cBhvr>
-                                        <p:cTn id="10" dur="1" fill="hold">
-                                          <p:stCondLst>
-                                            <p:cond delay="0"/>
-                                          </p:stCondLst>
-                                        </p:cTn>
-                                        <p:tgtEl>
-                                          <p:spTgt spid="5">
-                                            <p:txEl>
-                                              <p:pRg st="2" end="2"/>
-                                            </p:txEl>
-                                          </p:spTgt>
-                                        </p:tgtEl>
-                                        <p:attrNameLst>
-                                          <p:attrName>style.visibility</p:attrName>
-                                        </p:attrNameLst>
-                                      </p:cBhvr>
-                                      <p:to>
-                                        <p:strVal val="visible"/>
-                                      </p:to>
-                                    </p:set>
-                                  </p:childTnLst>
-                                </p:cTn>
-                              </p:par>
-                            </p:childTnLst>
-                          </p:cTn>
-                        </p:par>
-                      </p:childTnLst>
-                    </p:cTn>
-                  </p:par>
-                  <p:par>
-                    <p:cTn id="11" fill="hold">
-                      <p:stCondLst>
-                        <p:cond delay="indefinite"/>
-                      </p:stCondLst>
-                      <p:childTnLst>
-                        <p:par>
-                          <p:cTn id="12" fill="hold">
-                            <p:stCondLst>
-                              <p:cond delay="0"/>
-                            </p:stCondLst>
-                            <p:childTnLst>
-                              <p:par>
-                                <p:cTn id="13" presetID="1" presetClass="entr" presetSubtype="0" fill="hold" nodeType="clickEffect">
-                                  <p:stCondLst>
-                                    <p:cond delay="0"/>
-                                  </p:stCondLst>
-                                  <p:childTnLst>
-                                    <p:set>
-                                      <p:cBhvr>
-                                        <p:cTn id="14" dur="1" fill="hold">
-                                          <p:stCondLst>
-                                            <p:cond delay="0"/>
-                                          </p:stCondLst>
-                                        </p:cTn>
-                                        <p:tgtEl>
-                                          <p:spTgt spid="5">
-                                            <p:txEl>
-                                              <p:pRg st="4" end="4"/>
-                                            </p:txEl>
-                                          </p:spTgt>
-                                        </p:tgtEl>
-                                        <p:attrNameLst>
-                                          <p:attrName>style.visibility</p:attrName>
-                                        </p:attrNameLst>
-                                      </p:cBhvr>
-                                      <p:to>
-                                        <p:strVal val="visible"/>
-                                      </p:to>
-                                    </p:set>
-                                  </p:childTnLst>
-                                </p:cTn>
-                              </p:par>
-                            </p:childTnLst>
-                          </p:cTn>
-                        </p:par>
-                      </p:childTnLst>
-                    </p:cTn>
-                  </p:par>
-                  <p:par>
-                    <p:cTn id="15" fill="hold">
-                      <p:stCondLst>
-                        <p:cond delay="indefinite"/>
-                      </p:stCondLst>
-                      <p:childTnLst>
-                        <p:par>
-                          <p:cTn id="16" fill="hold">
-                            <p:stCondLst>
-                              <p:cond delay="0"/>
-                            </p:stCondLst>
-                            <p:childTnLst>
-                              <p:par>
-                                <p:cTn id="17" presetID="1" presetClass="entr" presetSubtype="0" fill="hold" nodeType="clickEffect">
-                                  <p:stCondLst>
-                                    <p:cond delay="0"/>
-                                  </p:stCondLst>
-                                  <p:childTnLst>
-                                    <p:set>
-                                      <p:cBhvr>
-                                        <p:cTn id="18" dur="1" fill="hold">
-                                          <p:stCondLst>
-                                            <p:cond delay="0"/>
-                                          </p:stCondLst>
-                                        </p:cTn>
-                                        <p:tgtEl>
-                                          <p:spTgt spid="5">
-                                            <p:txEl>
-                                              <p:pRg st="6" end="6"/>
-                                            </p:txEl>
-                                          </p:spTgt>
-                                        </p:tgtEl>
-                                        <p:attrNameLst>
-                                          <p:attrName>style.visibility</p:attrName>
-                                        </p:attrNameLst>
-                                      </p:cBhvr>
-                                      <p:to>
-                                        <p:strVal val="visible"/>
-                                      </p:to>
-                                    </p:set>
-                                  </p:childTnLst>
-                                </p:cTn>
-                              </p:par>
-                            </p:childTnLst>
-                          </p:cTn>
-                        </p:par>
-                      </p:childTnLst>
-                    </p:cTn>
-                  </p:par>
-                </p:childTnLst>
-              </p:cTn>
-              <p:prevCondLst>
-                <p:cond evt="onPrev" delay="0">
-                  <p:tgtEl>
-                    <p:sldTgt/>
-                  </p:tgtEl>
-                </p:cond>
-              </p:prevCondLst>
-              <p:nextCondLst>
-                <p:cond evt="onNext" delay="0">
-                  <p:tgtEl>
-                    <p:sldTgt/>
-                  </p:tgtEl>
-                </p:cond>
-              </p:nextCondLst>
-            </p:seq>
-          </p:childTnLst>
-        </p:cTn>
-      </p:par>
-    </p:tnLst>
-  </p:timing>
-</p:sld>
-</file>
-
-<file path=ppt/slides/slide9.xml><?xml version="1.0" encoding="utf-8"?>
-<p:sld xmlns:a="http://schemas.openxmlformats.org/drawingml/2006/main" xmlns:r="http://schemas.openxmlformats.org/officeDocument/2006/relationships" xmlns:p="http://schemas.openxmlformats.org/presentationml/2006/main">
-  <p:cSld>
-    <p:spTree>
-      <p:nvGrpSpPr>
-        <p:cNvPr id="1" name=""/>
-        <p:cNvGrpSpPr/>
-        <p:nvPr/>
-      </p:nvGrpSpPr>
-      <p:grpSpPr>
-        <a:xfrm>
-          <a:off x="0" y="0"/>
-          <a:ext cx="0" cy="0"/>
-          <a:chOff x="0" y="0"/>
-          <a:chExt cx="0" cy="0"/>
-        </a:xfrm>
-      </p:grpSpPr>
-      <p:sp>
-        <p:nvSpPr>
-          <p:cNvPr id="4" name="Content Placeholder 3"/>
-          <p:cNvSpPr>
-            <a:spLocks noGrp="1"/>
-          </p:cNvSpPr>
-          <p:nvPr>
-            <p:ph sz="quarter" idx="11"/>
-          </p:nvPr>
-        </p:nvSpPr>
-        <p:spPr>
-          <a:xfrm>
-            <a:off x="414337" y="495300"/>
-            <a:ext cx="6400800" cy="304800"/>
-          </a:xfrm>
-        </p:spPr>
-        <p:txBody>
-          <a:bodyPr/>
-          <a:lstStyle/>
-          <a:p>
-            <a:pPr eaLnBrk="1" hangingPunct="1">
+              <a:t>hours</a:t>
+            </a:r>
+            <a:endParaRPr lang="en-US" sz="2000" dirty="0"/>
+          </a:p>
+          <a:p>
+            <a:pPr marL="285750" indent="-285750" algn="l">
               <a:lnSpc>
-                <a:spcPts val="2448"/>
+                <a:spcPct val="150000"/>
               </a:lnSpc>
-              <a:defRPr/>
-            </a:pPr>
-            <a:r>
-              <a:rPr lang="en-US" dirty="0" smtClean="0"/>
-              <a:t>Logistics</a:t>
-            </a:r>
-          </a:p>
-        </p:txBody>
-      </p:sp>
-      <p:sp>
-        <p:nvSpPr>
-          <p:cNvPr id="8" name="Slide Number Placeholder 3"/>
-          <p:cNvSpPr>
-            <a:spLocks noGrp="1"/>
-          </p:cNvSpPr>
-          <p:nvPr>
-            <p:ph type="sldNum" sz="quarter" idx="13"/>
-          </p:nvPr>
-        </p:nvSpPr>
-        <p:spPr/>
-        <p:txBody>
-          <a:bodyPr/>
-          <a:lstStyle/>
-          <a:p>
-            <a:pPr>
-              <a:defRPr/>
-            </a:pPr>
-            <a:fld id="{BD5AD749-DAD1-6A4A-A2AA-CB20EAD0AEB7}" type="slidenum">
-              <a:rPr lang="en-US"/>
-              <a:pPr>
-                <a:defRPr/>
-              </a:pPr>
-              <a:t>9</a:t>
-            </a:fld>
-            <a:endParaRPr lang="en-US"/>
-          </a:p>
-        </p:txBody>
-      </p:sp>
-      <p:sp>
-        <p:nvSpPr>
-          <p:cNvPr id="5" name="Rectangle 4"/>
-          <p:cNvSpPr/>
-          <p:nvPr/>
-        </p:nvSpPr>
-        <p:spPr>
-          <a:xfrm>
-            <a:off x="1100137" y="1257300"/>
-            <a:ext cx="6858000" cy="2554545"/>
-          </a:xfrm>
-          <a:prstGeom prst="rect">
-            <a:avLst/>
-          </a:prstGeom>
-        </p:spPr>
-        <p:txBody>
-          <a:bodyPr wrap="square">
-            <a:spAutoFit/>
-          </a:bodyPr>
-          <a:lstStyle/>
-          <a:p>
-            <a:pPr marL="285750" indent="-285750" algn="l">
               <a:buFont typeface="Arial"/>
               <a:buChar char="•"/>
             </a:pPr>
             <a:r>
+              <a:rPr lang="en-US" sz="2000" dirty="0" err="1"/>
+              <a:t>GitHub</a:t>
+            </a:r>
+            <a:r>
+              <a:rPr lang="en-US" sz="2000" dirty="0"/>
+              <a:t> for course content and </a:t>
+            </a:r>
+            <a:r>
               <a:rPr lang="en-US" sz="2000" dirty="0" smtClean="0"/>
-              <a:t>Bathrooms</a:t>
-            </a:r>
-          </a:p>
-          <a:p>
-            <a:pPr marL="285750" indent="-285750" algn="l">
-              <a:buFont typeface="Arial"/>
-              <a:buChar char="•"/>
-            </a:pPr>
+              <a:t>homework</a:t>
+            </a:r>
             <a:endParaRPr lang="en-US" sz="2000" dirty="0"/>
-          </a:p>
-          <a:p>
-            <a:pPr marL="285750" indent="-285750" algn="l">
-              <a:buFont typeface="Arial"/>
-              <a:buChar char="•"/>
-            </a:pPr>
-            <a:r>
-              <a:rPr lang="en-US" sz="2000" dirty="0"/>
-              <a:t>Parking</a:t>
-            </a:r>
           </a:p>
           <a:p>
             <a:pPr marL="285750" indent="-285750" algn="l">
@@ -10960,150 +10366,6 @@
               <a:buChar char="•"/>
             </a:pPr>
             <a:endParaRPr lang="en-US" sz="2000" dirty="0" smtClean="0"/>
-          </a:p>
-          <a:p>
-            <a:pPr marL="285750" indent="-285750" algn="l">
-              <a:buFont typeface="Arial"/>
-              <a:buChar char="•"/>
-            </a:pPr>
-            <a:r>
-              <a:rPr lang="en-US" sz="2000" dirty="0" smtClean="0"/>
-              <a:t>Dress </a:t>
-            </a:r>
-            <a:r>
-              <a:rPr lang="en-US" sz="2000" dirty="0"/>
-              <a:t>code</a:t>
-            </a:r>
-          </a:p>
-          <a:p>
-            <a:pPr marL="285750" indent="-285750" algn="l">
-              <a:buFont typeface="Arial"/>
-              <a:buChar char="•"/>
-            </a:pPr>
-            <a:endParaRPr lang="en-US" sz="2000" dirty="0" smtClean="0"/>
-          </a:p>
-          <a:p>
-            <a:pPr marL="285750" indent="-285750" algn="l">
-              <a:buFont typeface="Arial"/>
-              <a:buChar char="•"/>
-            </a:pPr>
-            <a:r>
-              <a:rPr lang="en-US" sz="2000" dirty="0" smtClean="0"/>
-              <a:t>Start </a:t>
-            </a:r>
-            <a:r>
-              <a:rPr lang="en-US" sz="2000" dirty="0"/>
-              <a:t>and end on time</a:t>
-            </a:r>
-          </a:p>
-          <a:p>
-            <a:pPr marL="285750" indent="-285750" algn="l">
-              <a:buFont typeface="Arial"/>
-              <a:buChar char="•"/>
-            </a:pPr>
-            <a:endParaRPr lang="en-US" sz="2000" dirty="0" smtClean="0"/>
-          </a:p>
-        </p:txBody>
-      </p:sp>
-      <p:sp>
-        <p:nvSpPr>
-          <p:cNvPr id="2" name="Rectangle 1"/>
-          <p:cNvSpPr/>
-          <p:nvPr/>
-        </p:nvSpPr>
-        <p:spPr>
-          <a:xfrm>
-            <a:off x="5214937" y="1257300"/>
-            <a:ext cx="3196468" cy="2862322"/>
-          </a:xfrm>
-          <a:prstGeom prst="rect">
-            <a:avLst/>
-          </a:prstGeom>
-        </p:spPr>
-        <p:txBody>
-          <a:bodyPr wrap="square">
-            <a:spAutoFit/>
-          </a:bodyPr>
-          <a:lstStyle/>
-          <a:p>
-            <a:pPr marL="285750" indent="-285750" algn="l">
-              <a:buFont typeface="Arial"/>
-              <a:buChar char="•"/>
-            </a:pPr>
-            <a:r>
-              <a:rPr lang="en-US" sz="2000" dirty="0"/>
-              <a:t>Missing class</a:t>
-            </a:r>
-          </a:p>
-          <a:p>
-            <a:pPr marL="285750" indent="-285750" algn="l">
-              <a:buFont typeface="Arial"/>
-              <a:buChar char="•"/>
-            </a:pPr>
-            <a:endParaRPr lang="en-US" sz="2000" dirty="0"/>
-          </a:p>
-          <a:p>
-            <a:pPr marL="285750" indent="-285750" algn="l">
-              <a:buFont typeface="Arial"/>
-              <a:buChar char="•"/>
-            </a:pPr>
-            <a:r>
-              <a:rPr lang="en-US" sz="2000" dirty="0"/>
-              <a:t>Slack instead of email</a:t>
-            </a:r>
-          </a:p>
-          <a:p>
-            <a:pPr marL="285750" indent="-285750" algn="l">
-              <a:buFont typeface="Arial"/>
-              <a:buChar char="•"/>
-            </a:pPr>
-            <a:endParaRPr lang="en-US" sz="2000" dirty="0"/>
-          </a:p>
-          <a:p>
-            <a:pPr marL="285750" indent="-285750" algn="l">
-              <a:buFont typeface="Arial"/>
-              <a:buChar char="•"/>
-            </a:pPr>
-            <a:r>
-              <a:rPr lang="en-US" sz="2000" dirty="0"/>
-              <a:t>Office </a:t>
-            </a:r>
-            <a:r>
-              <a:rPr lang="en-US" sz="2000" dirty="0" smtClean="0"/>
-              <a:t>hours</a:t>
-            </a:r>
-          </a:p>
-          <a:p>
-            <a:pPr marL="285750" indent="-285750" algn="l">
-              <a:buFont typeface="Arial"/>
-              <a:buChar char="•"/>
-            </a:pPr>
-            <a:endParaRPr lang="en-US" sz="2000" dirty="0"/>
-          </a:p>
-          <a:p>
-            <a:pPr marL="285750" indent="-285750" algn="l">
-              <a:buFont typeface="Arial"/>
-              <a:buChar char="•"/>
-            </a:pPr>
-            <a:r>
-              <a:rPr lang="en-US" sz="2000" dirty="0" err="1" smtClean="0"/>
-              <a:t>GitHub</a:t>
-            </a:r>
-            <a:r>
-              <a:rPr lang="en-US" sz="2000" dirty="0" smtClean="0"/>
-              <a:t> </a:t>
-            </a:r>
-            <a:r>
-              <a:rPr lang="en-US" sz="2000" dirty="0"/>
-              <a:t>for course content and homework</a:t>
-            </a:r>
-          </a:p>
-          <a:p>
-            <a:pPr marL="285750" indent="-285750" algn="l">
-              <a:buFont typeface="Arial"/>
-              <a:buChar char="•"/>
-            </a:pPr>
-            <a:endParaRPr lang="en-US" sz="2000" dirty="0"/>
           </a:p>
         </p:txBody>
       </p:sp>
@@ -11203,7 +10465,7 @@
                                         <p:tgtEl>
                                           <p:spTgt spid="5">
                                             <p:txEl>
-                                              <p:pRg st="2" end="2"/>
+                                              <p:pRg st="1" end="1"/>
                                             </p:txEl>
                                           </p:spTgt>
                                         </p:tgtEl>
@@ -11252,7 +10514,7 @@
                                         <p:tgtEl>
                                           <p:spTgt spid="5">
                                             <p:txEl>
-                                              <p:pRg st="4" end="4"/>
+                                              <p:pRg st="2" end="2"/>
                                             </p:txEl>
                                           </p:spTgt>
                                         </p:tgtEl>
@@ -11301,7 +10563,203 @@
                                         <p:tgtEl>
                                           <p:spTgt spid="5">
                                             <p:txEl>
+                                              <p:pRg st="3" end="3"/>
+                                            </p:txEl>
+                                          </p:spTgt>
+                                        </p:tgtEl>
+                                        <p:attrNameLst>
+                                          <p:attrName>style.visibility</p:attrName>
+                                        </p:attrNameLst>
+                                      </p:cBhvr>
+                                      <p:to>
+                                        <p:strVal val="visible"/>
+                                      </p:to>
+                                    </p:set>
+                                  </p:childTnLst>
+                                </p:cTn>
+                              </p:par>
+                            </p:childTnLst>
+                          </p:cTn>
+                        </p:par>
+                      </p:childTnLst>
+                    </p:cTn>
+                  </p:par>
+                  <p:par>
+                    <p:cTn id="19" fill="hold">
+                      <p:stCondLst>
+                        <p:cond delay="indefinite"/>
+                      </p:stCondLst>
+                      <p:childTnLst>
+                        <p:par>
+                          <p:cTn id="20" fill="hold">
+                            <p:stCondLst>
+                              <p:cond delay="0"/>
+                            </p:stCondLst>
+                            <p:childTnLst>
+                              <p:par>
+                                <p:cTn id="21" presetID="1" presetClass="entr" presetSubtype="0" fill="hold" nodeType="clickEffect">
+                                  <p:stCondLst>
+                                    <p:cond delay="0"/>
+                                  </p:stCondLst>
+                                  <p:childTnLst>
+                                    <p:set>
+                                      <p:cBhvr>
+                                        <p:cTn id="22" dur="1" fill="hold">
+                                          <p:stCondLst>
+                                            <p:cond delay="0"/>
+                                          </p:stCondLst>
+                                        </p:cTn>
+                                        <p:tgtEl>
+                                          <p:spTgt spid="5">
+                                            <p:txEl>
+                                              <p:pRg st="4" end="4"/>
+                                            </p:txEl>
+                                          </p:spTgt>
+                                        </p:tgtEl>
+                                        <p:attrNameLst>
+                                          <p:attrName>style.visibility</p:attrName>
+                                        </p:attrNameLst>
+                                      </p:cBhvr>
+                                      <p:to>
+                                        <p:strVal val="visible"/>
+                                      </p:to>
+                                    </p:set>
+                                  </p:childTnLst>
+                                </p:cTn>
+                              </p:par>
+                            </p:childTnLst>
+                          </p:cTn>
+                        </p:par>
+                      </p:childTnLst>
+                    </p:cTn>
+                  </p:par>
+                  <p:par>
+                    <p:cTn id="23" fill="hold">
+                      <p:stCondLst>
+                        <p:cond delay="indefinite"/>
+                      </p:stCondLst>
+                      <p:childTnLst>
+                        <p:par>
+                          <p:cTn id="24" fill="hold">
+                            <p:stCondLst>
+                              <p:cond delay="0"/>
+                            </p:stCondLst>
+                            <p:childTnLst>
+                              <p:par>
+                                <p:cTn id="25" presetID="1" presetClass="entr" presetSubtype="0" fill="hold" nodeType="clickEffect">
+                                  <p:stCondLst>
+                                    <p:cond delay="0"/>
+                                  </p:stCondLst>
+                                  <p:childTnLst>
+                                    <p:set>
+                                      <p:cBhvr>
+                                        <p:cTn id="26" dur="1" fill="hold">
+                                          <p:stCondLst>
+                                            <p:cond delay="0"/>
+                                          </p:stCondLst>
+                                        </p:cTn>
+                                        <p:tgtEl>
+                                          <p:spTgt spid="5">
+                                            <p:txEl>
+                                              <p:pRg st="5" end="5"/>
+                                            </p:txEl>
+                                          </p:spTgt>
+                                        </p:tgtEl>
+                                        <p:attrNameLst>
+                                          <p:attrName>style.visibility</p:attrName>
+                                        </p:attrNameLst>
+                                      </p:cBhvr>
+                                      <p:to>
+                                        <p:strVal val="visible"/>
+                                      </p:to>
+                                    </p:set>
+                                  </p:childTnLst>
+                                </p:cTn>
+                              </p:par>
+                            </p:childTnLst>
+                          </p:cTn>
+                        </p:par>
+                      </p:childTnLst>
+                    </p:cTn>
+                  </p:par>
+                  <p:par>
+                    <p:cTn id="27" fill="hold">
+                      <p:stCondLst>
+                        <p:cond delay="indefinite"/>
+                      </p:stCondLst>
+                      <p:childTnLst>
+                        <p:par>
+                          <p:cTn id="28" fill="hold">
+                            <p:stCondLst>
+                              <p:cond delay="0"/>
+                            </p:stCondLst>
+                            <p:childTnLst>
+                              <p:par>
+                                <p:cTn id="29" presetID="1" presetClass="entr" presetSubtype="0" fill="hold" nodeType="clickEffect">
+                                  <p:stCondLst>
+                                    <p:cond delay="0"/>
+                                  </p:stCondLst>
+                                  <p:childTnLst>
+                                    <p:set>
+                                      <p:cBhvr>
+                                        <p:cTn id="30" dur="1" fill="hold">
+                                          <p:stCondLst>
+                                            <p:cond delay="0"/>
+                                          </p:stCondLst>
+                                        </p:cTn>
+                                        <p:tgtEl>
+                                          <p:spTgt spid="5">
+                                            <p:txEl>
                                               <p:pRg st="6" end="6"/>
+                                            </p:txEl>
+                                          </p:spTgt>
+                                        </p:tgtEl>
+                                        <p:attrNameLst>
+                                          <p:attrName>style.visibility</p:attrName>
+                                        </p:attrNameLst>
+                                      </p:cBhvr>
+                                      <p:to>
+                                        <p:strVal val="visible"/>
+                                      </p:to>
+                                    </p:set>
+                                  </p:childTnLst>
+                                </p:cTn>
+                              </p:par>
+                            </p:childTnLst>
+                          </p:cTn>
+                        </p:par>
+                      </p:childTnLst>
+                    </p:cTn>
+                  </p:par>
+                  <p:par>
+                    <p:cTn id="31" fill="hold">
+                      <p:stCondLst>
+                        <p:cond delay="indefinite"/>
+                      </p:stCondLst>
+                      <p:childTnLst>
+                        <p:par>
+                          <p:cTn id="32" fill="hold">
+                            <p:stCondLst>
+                              <p:cond delay="0"/>
+                            </p:stCondLst>
+                            <p:childTnLst>
+                              <p:par>
+                                <p:cTn id="33" presetID="1" presetClass="entr" presetSubtype="0" fill="hold" nodeType="clickEffect">
+                                  <p:stCondLst>
+                                    <p:cond delay="0"/>
+                                  </p:stCondLst>
+                                  <p:childTnLst>
+                                    <p:set>
+                                      <p:cBhvr>
+                                        <p:cTn id="34" dur="1" fill="hold">
+                                          <p:stCondLst>
+                                            <p:cond delay="0"/>
+                                          </p:stCondLst>
+                                        </p:cTn>
+                                        <p:tgtEl>
+                                          <p:spTgt spid="5">
+                                            <p:txEl>
+                                              <p:pRg st="7" end="7"/>
                                             </p:txEl>
                                           </p:spTgt>
                                         </p:tgtEl>
@@ -11341,6 +10799,118 @@
             </p:seq>
           </p:childTnLst>
         </p:cTn>
+      </p:par>
+    </p:tnLst>
+  </p:timing>
+</p:sld>
+</file>
+
+<file path=ppt/slides/slide9.xml><?xml version="1.0" encoding="utf-8"?>
+<p:sld xmlns:a="http://schemas.openxmlformats.org/drawingml/2006/main" xmlns:r="http://schemas.openxmlformats.org/officeDocument/2006/relationships" xmlns:p="http://schemas.openxmlformats.org/presentationml/2006/main">
+  <p:cSld>
+    <p:spTree>
+      <p:nvGrpSpPr>
+        <p:cNvPr id="1" name=""/>
+        <p:cNvGrpSpPr/>
+        <p:nvPr/>
+      </p:nvGrpSpPr>
+      <p:grpSpPr>
+        <a:xfrm>
+          <a:off x="0" y="0"/>
+          <a:ext cx="0" cy="0"/>
+          <a:chOff x="0" y="0"/>
+          <a:chExt cx="0" cy="0"/>
+        </a:xfrm>
+      </p:grpSpPr>
+      <p:sp>
+        <p:nvSpPr>
+          <p:cNvPr id="2" name="Title 1"/>
+          <p:cNvSpPr>
+            <a:spLocks noGrp="1"/>
+          </p:cNvSpPr>
+          <p:nvPr>
+            <p:ph type="title"/>
+          </p:nvPr>
+        </p:nvSpPr>
+        <p:spPr>
+          <a:xfrm>
+            <a:off x="338137" y="3238500"/>
+            <a:ext cx="8426450" cy="1055687"/>
+          </a:xfrm>
+        </p:spPr>
+        <p:txBody>
+          <a:bodyPr/>
+          <a:lstStyle/>
+          <a:p>
+            <a:pPr>
+              <a:defRPr/>
+            </a:pPr>
+            <a:r>
+              <a:rPr lang="en-US" dirty="0" smtClean="0"/>
+              <a:t>Questions?</a:t>
+            </a:r>
+            <a:endParaRPr lang="en-US" sz="2000" dirty="0">
+              <a:latin typeface="+mn-lt"/>
+            </a:endParaRPr>
+          </a:p>
+        </p:txBody>
+      </p:sp>
+      <p:sp>
+        <p:nvSpPr>
+          <p:cNvPr id="4" name="Content Placeholder 3"/>
+          <p:cNvSpPr>
+            <a:spLocks noGrp="1"/>
+          </p:cNvSpPr>
+          <p:nvPr>
+            <p:ph sz="quarter" idx="11"/>
+          </p:nvPr>
+        </p:nvSpPr>
+        <p:spPr>
+          <a:xfrm>
+            <a:off x="371475" y="495300"/>
+            <a:ext cx="6400800" cy="304800"/>
+          </a:xfrm>
+        </p:spPr>
+        <p:txBody>
+          <a:bodyPr wrap="square" lIns="91440" tIns="45720" rIns="91440" bIns="45720" numCol="1" anchor="t" anchorCtr="0" compatLnSpc="1">
+            <a:prstTxWarp prst="textNoShape">
+              <a:avLst/>
+            </a:prstTxWarp>
+          </a:bodyPr>
+          <a:lstStyle/>
+          <a:p>
+            <a:pPr marL="0" indent="0"/>
+            <a:r>
+              <a:rPr lang="en-US" cap="none" dirty="0" smtClean="0">
+                <a:latin typeface="PFDinTextCompPro-Bold" charset="0"/>
+                <a:ea typeface="ヒラギノ角ゴ ProN W3" charset="0"/>
+                <a:cs typeface="ヒラギノ角ゴ ProN W3" charset="0"/>
+              </a:rPr>
+              <a:t>COURSE OVERVIEW</a:t>
+            </a:r>
+            <a:endParaRPr lang="en-US" cap="none" dirty="0">
+              <a:latin typeface="PFDinTextCompPro-Bold" charset="0"/>
+              <a:ea typeface="ヒラギノ角ゴ ProN W3" charset="0"/>
+              <a:cs typeface="ヒラギノ角ゴ ProN W3" charset="0"/>
+            </a:endParaRPr>
+          </a:p>
+        </p:txBody>
+      </p:sp>
+    </p:spTree>
+    <p:extLst>
+      <p:ext uri="{BB962C8B-B14F-4D97-AF65-F5344CB8AC3E}">
+        <p14:creationId xmlns:p14="http://schemas.microsoft.com/office/powerpoint/2010/main" val="3636308423"/>
+      </p:ext>
+    </p:extLst>
+  </p:cSld>
+  <p:clrMapOvr>
+    <a:masterClrMapping/>
+  </p:clrMapOvr>
+  <p:transition/>
+  <p:timing>
+    <p:tnLst>
+      <p:par>
+        <p:cTn id="1" dur="indefinite" restart="never" nodeType="tmRoot"/>
       </p:par>
     </p:tnLst>
   </p:timing>

</xml_diff>